<commit_message>
updated TOC in 02_prediction
</commit_message>
<xml_diff>
--- a/manuscript/Figs/Data_to_classes_notebook.pptx
+++ b/manuscript/Figs/Data_to_classes_notebook.pptx
@@ -304,7 +304,7 @@
           <a:p>
             <a:fld id="{2D6FD26E-F72A-744E-A770-7758A17815C3}" type="datetimeFigureOut">
               <a:rPr lang="en-US" smtClean="0"/>
-              <a:t>9/25/17</a:t>
+              <a:t>9/26/17</a:t>
             </a:fld>
             <a:endParaRPr lang="en-US"/>
           </a:p>
@@ -474,7 +474,7 @@
           <a:p>
             <a:fld id="{2D6FD26E-F72A-744E-A770-7758A17815C3}" type="datetimeFigureOut">
               <a:rPr lang="en-US" smtClean="0"/>
-              <a:t>9/25/17</a:t>
+              <a:t>9/26/17</a:t>
             </a:fld>
             <a:endParaRPr lang="en-US"/>
           </a:p>
@@ -654,7 +654,7 @@
           <a:p>
             <a:fld id="{2D6FD26E-F72A-744E-A770-7758A17815C3}" type="datetimeFigureOut">
               <a:rPr lang="en-US" smtClean="0"/>
-              <a:t>9/25/17</a:t>
+              <a:t>9/26/17</a:t>
             </a:fld>
             <a:endParaRPr lang="en-US"/>
           </a:p>
@@ -824,7 +824,7 @@
           <a:p>
             <a:fld id="{2D6FD26E-F72A-744E-A770-7758A17815C3}" type="datetimeFigureOut">
               <a:rPr lang="en-US" smtClean="0"/>
-              <a:t>9/25/17</a:t>
+              <a:t>9/26/17</a:t>
             </a:fld>
             <a:endParaRPr lang="en-US"/>
           </a:p>
@@ -1070,7 +1070,7 @@
           <a:p>
             <a:fld id="{2D6FD26E-F72A-744E-A770-7758A17815C3}" type="datetimeFigureOut">
               <a:rPr lang="en-US" smtClean="0"/>
-              <a:t>9/25/17</a:t>
+              <a:t>9/26/17</a:t>
             </a:fld>
             <a:endParaRPr lang="en-US"/>
           </a:p>
@@ -1358,7 +1358,7 @@
           <a:p>
             <a:fld id="{2D6FD26E-F72A-744E-A770-7758A17815C3}" type="datetimeFigureOut">
               <a:rPr lang="en-US" smtClean="0"/>
-              <a:t>9/25/17</a:t>
+              <a:t>9/26/17</a:t>
             </a:fld>
             <a:endParaRPr lang="en-US"/>
           </a:p>
@@ -1780,7 +1780,7 @@
           <a:p>
             <a:fld id="{2D6FD26E-F72A-744E-A770-7758A17815C3}" type="datetimeFigureOut">
               <a:rPr lang="en-US" smtClean="0"/>
-              <a:t>9/25/17</a:t>
+              <a:t>9/26/17</a:t>
             </a:fld>
             <a:endParaRPr lang="en-US"/>
           </a:p>
@@ -1898,7 +1898,7 @@
           <a:p>
             <a:fld id="{2D6FD26E-F72A-744E-A770-7758A17815C3}" type="datetimeFigureOut">
               <a:rPr lang="en-US" smtClean="0"/>
-              <a:t>9/25/17</a:t>
+              <a:t>9/26/17</a:t>
             </a:fld>
             <a:endParaRPr lang="en-US"/>
           </a:p>
@@ -1993,7 +1993,7 @@
           <a:p>
             <a:fld id="{2D6FD26E-F72A-744E-A770-7758A17815C3}" type="datetimeFigureOut">
               <a:rPr lang="en-US" smtClean="0"/>
-              <a:t>9/25/17</a:t>
+              <a:t>9/26/17</a:t>
             </a:fld>
             <a:endParaRPr lang="en-US"/>
           </a:p>
@@ -2270,7 +2270,7 @@
           <a:p>
             <a:fld id="{2D6FD26E-F72A-744E-A770-7758A17815C3}" type="datetimeFigureOut">
               <a:rPr lang="en-US" smtClean="0"/>
-              <a:t>9/25/17</a:t>
+              <a:t>9/26/17</a:t>
             </a:fld>
             <a:endParaRPr lang="en-US"/>
           </a:p>
@@ -2523,7 +2523,7 @@
           <a:p>
             <a:fld id="{2D6FD26E-F72A-744E-A770-7758A17815C3}" type="datetimeFigureOut">
               <a:rPr lang="en-US" smtClean="0"/>
-              <a:t>9/25/17</a:t>
+              <a:t>9/26/17</a:t>
             </a:fld>
             <a:endParaRPr lang="en-US"/>
           </a:p>
@@ -2736,7 +2736,7 @@
           <a:p>
             <a:fld id="{2D6FD26E-F72A-744E-A770-7758A17815C3}" type="datetimeFigureOut">
               <a:rPr lang="en-US" smtClean="0"/>
-              <a:t>9/25/17</a:t>
+              <a:t>9/26/17</a:t>
             </a:fld>
             <a:endParaRPr lang="en-US"/>
           </a:p>
@@ -3195,11 +3195,7 @@
             </a:r>
             <a:r>
               <a:rPr lang="en-US" sz="1400" dirty="0" smtClean="0"/>
-              <a:t>rade              SNAP1</a:t>
-            </a:r>
-            <a:r>
-              <a:rPr lang="en-US" sz="1400" dirty="0" smtClean="0"/>
-              <a:t>, </a:t>
+              <a:t>rade              SNAP1, </a:t>
             </a:r>
             <a:r>
               <a:rPr lang="is-IS" sz="1400" dirty="0" smtClean="0"/>
@@ -3257,14 +3253,14 @@
       </p:sp>
       <p:sp>
         <p:nvSpPr>
-          <p:cNvPr id="35" name="TextBox 34"/>
+          <p:cNvPr id="38" name="TextBox 37"/>
           <p:cNvSpPr txBox="1"/>
           <p:nvPr/>
         </p:nvSpPr>
         <p:spPr>
           <a:xfrm>
-            <a:off x="4759219" y="2693857"/>
-            <a:ext cx="789127" cy="1754326"/>
+            <a:off x="6149597" y="640257"/>
+            <a:ext cx="1792927" cy="276999"/>
           </a:xfrm>
           <a:prstGeom prst="rect">
             <a:avLst/>
@@ -3278,76 +3274,8 @@
           <a:lstStyle/>
           <a:p>
             <a:r>
-              <a:rPr lang="en-US" dirty="0" smtClean="0"/>
-              <a:t> MLR</a:t>
-            </a:r>
-            <a:endParaRPr lang="en-US" dirty="0" smtClean="0"/>
-          </a:p>
-          <a:p>
-            <a:r>
-              <a:rPr lang="en-US" dirty="0" smtClean="0"/>
-              <a:t> MLP</a:t>
-            </a:r>
-            <a:endParaRPr lang="en-US" dirty="0" smtClean="0"/>
-          </a:p>
-          <a:p>
-            <a:r>
-              <a:rPr lang="en-US" dirty="0" smtClean="0"/>
-              <a:t> XGB</a:t>
-            </a:r>
-            <a:endParaRPr lang="en-US" dirty="0" smtClean="0"/>
-          </a:p>
-          <a:p>
-            <a:r>
-              <a:rPr lang="en-US" dirty="0" smtClean="0"/>
-              <a:t> SVM</a:t>
-            </a:r>
-            <a:endParaRPr lang="en-US" dirty="0" smtClean="0"/>
-          </a:p>
-          <a:p>
-            <a:r>
-              <a:rPr lang="en-US" dirty="0" smtClean="0"/>
-              <a:t> KNN</a:t>
-            </a:r>
-          </a:p>
-          <a:p>
-            <a:r>
-              <a:rPr lang="en-US" dirty="0" smtClean="0"/>
-              <a:t>Voting</a:t>
-            </a:r>
-            <a:endParaRPr lang="en-US" dirty="0"/>
-          </a:p>
-        </p:txBody>
-      </p:sp>
-      <p:sp>
-        <p:nvSpPr>
-          <p:cNvPr id="38" name="TextBox 37"/>
-          <p:cNvSpPr txBox="1"/>
-          <p:nvPr/>
-        </p:nvSpPr>
-        <p:spPr>
-          <a:xfrm>
-            <a:off x="6149597" y="640257"/>
-            <a:ext cx="1792927" cy="276999"/>
-          </a:xfrm>
-          <a:prstGeom prst="rect">
-            <a:avLst/>
-          </a:prstGeom>
-          <a:noFill/>
-        </p:spPr>
-        <p:txBody>
-          <a:bodyPr wrap="none" rtlCol="0">
-            <a:spAutoFit/>
-          </a:bodyPr>
-          <a:lstStyle/>
-          <a:p>
-            <a:r>
               <a:rPr lang="en-US" sz="1200" smtClean="0"/>
-              <a:t>Continuous    </a:t>
-            </a:r>
-            <a:r>
-              <a:rPr lang="en-US" sz="1200" smtClean="0"/>
-              <a:t>  </a:t>
+              <a:t>Continuous      </a:t>
             </a:r>
             <a:r>
               <a:rPr lang="en-US" sz="1200" dirty="0" smtClean="0"/>
@@ -3607,7 +3535,7 @@
         </p:blipFill>
         <p:spPr>
           <a:xfrm>
-            <a:off x="1060986" y="943870"/>
+            <a:off x="1060986" y="937854"/>
             <a:ext cx="707187" cy="5505567"/>
           </a:xfrm>
           <a:prstGeom prst="rect">
@@ -3784,11 +3712,7 @@
           <a:p>
             <a:r>
               <a:rPr lang="en-US" sz="900" dirty="0" smtClean="0"/>
-              <a:t>2   </a:t>
-            </a:r>
-            <a:r>
-              <a:rPr lang="en-US" sz="900" dirty="0" smtClean="0"/>
-              <a:t>3   4</a:t>
+              <a:t>2   3   4</a:t>
             </a:r>
             <a:endParaRPr lang="en-US" sz="900" dirty="0"/>
           </a:p>
@@ -3817,16 +3741,46 @@
           <a:lstStyle/>
           <a:p>
             <a:r>
-              <a:rPr lang="en-US" sz="900"/>
+              <a:rPr lang="en-US" sz="900" dirty="0"/>
               <a:t>0</a:t>
             </a:r>
             <a:r>
-              <a:rPr lang="en-US" sz="900" smtClean="0"/>
-              <a:t>    1</a:t>
-            </a:r>
-            <a:r>
-              <a:rPr lang="en-US" sz="900" smtClean="0"/>
-              <a:t>    2</a:t>
+              <a:rPr lang="en-US" sz="900" dirty="0" smtClean="0"/>
+              <a:t>    1    2</a:t>
+            </a:r>
+            <a:endParaRPr lang="en-US" sz="900" dirty="0"/>
+          </a:p>
+        </p:txBody>
+      </p:sp>
+      <p:sp>
+        <p:nvSpPr>
+          <p:cNvPr id="29" name="TextBox 28"/>
+          <p:cNvSpPr txBox="1"/>
+          <p:nvPr/>
+        </p:nvSpPr>
+        <p:spPr>
+          <a:xfrm>
+            <a:off x="6039334" y="6601633"/>
+            <a:ext cx="1043876" cy="230832"/>
+          </a:xfrm>
+          <a:prstGeom prst="rect">
+            <a:avLst/>
+          </a:prstGeom>
+          <a:noFill/>
+        </p:spPr>
+        <p:txBody>
+          <a:bodyPr wrap="none" rtlCol="0">
+            <a:spAutoFit/>
+          </a:bodyPr>
+          <a:lstStyle/>
+          <a:p>
+            <a:r>
+              <a:rPr lang="en-US" sz="900" dirty="0" smtClean="0"/>
+              <a:t>1    </a:t>
+            </a:r>
+            <a:r>
+              <a:rPr lang="en-US" sz="900" dirty="0" smtClean="0"/>
+              <a:t>2    3    4    5    6</a:t>
             </a:r>
             <a:endParaRPr lang="en-US" sz="900" dirty="0"/>
           </a:p>
@@ -3834,7 +3788,7 @@
       </p:sp>
       <p:pic>
         <p:nvPicPr>
-          <p:cNvPr id="14" name="Picture 13"/>
+          <p:cNvPr id="15" name="Picture 14"/>
           <p:cNvPicPr>
             <a:picLocks noChangeAspect="1"/>
           </p:cNvPicPr>
@@ -3848,13 +3802,13 @@
               </a:ext>
             </a:extLst>
           </a:blip>
-          <a:srcRect l="11359" t="32098" r="8036" b="32270"/>
+          <a:srcRect l="11681" t="12758" r="9527" b="13691"/>
           <a:stretch/>
         </p:blipFill>
         <p:spPr>
           <a:xfrm>
-            <a:off x="5881929" y="6462923"/>
-            <a:ext cx="1172014" cy="194284"/>
+            <a:off x="7289085" y="6469568"/>
+            <a:ext cx="482761" cy="168994"/>
           </a:xfrm>
           <a:prstGeom prst="rect">
             <a:avLst/>
@@ -3863,14 +3817,14 @@
       </p:pic>
       <p:sp>
         <p:nvSpPr>
-          <p:cNvPr id="29" name="TextBox 28"/>
+          <p:cNvPr id="31" name="TextBox 30"/>
           <p:cNvSpPr txBox="1"/>
           <p:nvPr/>
         </p:nvSpPr>
         <p:spPr>
           <a:xfrm>
-            <a:off x="5868109" y="6605491"/>
-            <a:ext cx="1207382" cy="230832"/>
+            <a:off x="7248977" y="6605491"/>
+            <a:ext cx="562975" cy="230832"/>
           </a:xfrm>
           <a:prstGeom prst="rect">
             <a:avLst/>
@@ -3884,68 +3838,186 @@
           <a:lstStyle/>
           <a:p>
             <a:r>
-              <a:rPr lang="en-US" sz="900" dirty="0"/>
+              <a:rPr lang="en-US" sz="900"/>
               <a:t>0</a:t>
             </a:r>
             <a:r>
-              <a:rPr lang="en-US" sz="900" dirty="0" smtClean="0"/>
-              <a:t>    1</a:t>
-            </a:r>
-            <a:r>
-              <a:rPr lang="en-US" sz="900" dirty="0" smtClean="0"/>
-              <a:t>    2    3    </a:t>
-            </a:r>
-            <a:r>
               <a:rPr lang="en-US" sz="900" smtClean="0"/>
-              <a:t>4    5    </a:t>
-            </a:r>
-            <a:r>
-              <a:rPr lang="en-US" sz="900" dirty="0" smtClean="0"/>
-              <a:t>6</a:t>
+              <a:t>    1    2</a:t>
             </a:r>
             <a:endParaRPr lang="en-US" sz="900" dirty="0"/>
           </a:p>
         </p:txBody>
       </p:sp>
-      <p:pic>
-        <p:nvPicPr>
-          <p:cNvPr id="15" name="Picture 14"/>
-          <p:cNvPicPr>
-            <a:picLocks noChangeAspect="1"/>
-          </p:cNvPicPr>
+      <p:sp>
+        <p:nvSpPr>
+          <p:cNvPr id="18" name="Rectangle 17"/>
+          <p:cNvSpPr/>
           <p:nvPr/>
-        </p:nvPicPr>
-        <p:blipFill rotWithShape="1">
-          <a:blip r:embed="rId11">
-            <a:extLst>
-              <a:ext uri="{28A0092B-C50C-407E-A947-70E740481C1C}">
-                <a14:useLocalDpi xmlns:a14="http://schemas.microsoft.com/office/drawing/2010/main" val="0"/>
-              </a:ext>
-            </a:extLst>
-          </a:blip>
-          <a:srcRect l="11681" t="12758" r="9527" b="13691"/>
-          <a:stretch/>
-        </p:blipFill>
-        <p:spPr>
-          <a:xfrm>
-            <a:off x="7289085" y="6469568"/>
-            <a:ext cx="482761" cy="168994"/>
+        </p:nvSpPr>
+        <p:spPr>
+          <a:xfrm>
+            <a:off x="6149597" y="6481291"/>
+            <a:ext cx="810646" cy="144653"/>
           </a:xfrm>
           <a:prstGeom prst="rect">
             <a:avLst/>
           </a:prstGeom>
-        </p:spPr>
-      </p:pic>
-      <p:sp>
-        <p:nvSpPr>
-          <p:cNvPr id="31" name="TextBox 30"/>
+          <a:gradFill>
+            <a:gsLst>
+              <a:gs pos="45000">
+                <a:srgbClr val="808080"/>
+              </a:gs>
+              <a:gs pos="0">
+                <a:schemeClr val="tx1">
+                  <a:lumMod val="31000"/>
+                </a:schemeClr>
+              </a:gs>
+              <a:gs pos="99000">
+                <a:schemeClr val="bg1"/>
+              </a:gs>
+            </a:gsLst>
+            <a:lin ang="0" scaled="1"/>
+          </a:gradFill>
+          <a:ln w="3175">
+            <a:solidFill>
+              <a:schemeClr val="tx1"/>
+            </a:solidFill>
+          </a:ln>
+          <a:effectLst/>
+        </p:spPr>
+        <p:style>
+          <a:lnRef idx="1">
+            <a:schemeClr val="accent1"/>
+          </a:lnRef>
+          <a:fillRef idx="3">
+            <a:schemeClr val="accent1"/>
+          </a:fillRef>
+          <a:effectRef idx="2">
+            <a:schemeClr val="accent1"/>
+          </a:effectRef>
+          <a:fontRef idx="minor">
+            <a:schemeClr val="lt1"/>
+          </a:fontRef>
+        </p:style>
+        <p:txBody>
+          <a:bodyPr rtlCol="0" anchor="ctr"/>
+          <a:lstStyle/>
+          <a:p>
+            <a:pPr algn="ctr"/>
+            <a:endParaRPr lang="en-US"/>
+          </a:p>
+        </p:txBody>
+      </p:sp>
+      <p:cxnSp>
+        <p:nvCxnSpPr>
+          <p:cNvPr id="21" name="Straight Connector 20"/>
+          <p:cNvCxnSpPr/>
+          <p:nvPr/>
+        </p:nvCxnSpPr>
+        <p:spPr>
+          <a:xfrm>
+            <a:off x="77491" y="3804400"/>
+            <a:ext cx="7534042" cy="22047"/>
+          </a:xfrm>
+          <a:prstGeom prst="line">
+            <a:avLst/>
+          </a:prstGeom>
+          <a:ln w="3175">
+            <a:solidFill>
+              <a:schemeClr val="tx1"/>
+            </a:solidFill>
+            <a:prstDash val="dash"/>
+          </a:ln>
+          <a:effectLst/>
+        </p:spPr>
+        <p:style>
+          <a:lnRef idx="2">
+            <a:schemeClr val="accent1"/>
+          </a:lnRef>
+          <a:fillRef idx="0">
+            <a:schemeClr val="accent1"/>
+          </a:fillRef>
+          <a:effectRef idx="1">
+            <a:schemeClr val="accent1"/>
+          </a:effectRef>
+          <a:fontRef idx="minor">
+            <a:schemeClr val="tx1"/>
+          </a:fontRef>
+        </p:style>
+      </p:cxnSp>
+      <p:sp>
+        <p:nvSpPr>
+          <p:cNvPr id="35" name="TextBox 34"/>
           <p:cNvSpPr txBox="1"/>
           <p:nvPr/>
         </p:nvSpPr>
         <p:spPr>
           <a:xfrm>
-            <a:off x="7248977" y="6605491"/>
-            <a:ext cx="562975" cy="230832"/>
+            <a:off x="4759219" y="2693857"/>
+            <a:ext cx="789127" cy="1754326"/>
+          </a:xfrm>
+          <a:prstGeom prst="rect">
+            <a:avLst/>
+          </a:prstGeom>
+          <a:solidFill>
+            <a:schemeClr val="bg1"/>
+          </a:solidFill>
+        </p:spPr>
+        <p:txBody>
+          <a:bodyPr wrap="none" rtlCol="0">
+            <a:spAutoFit/>
+          </a:bodyPr>
+          <a:lstStyle/>
+          <a:p>
+            <a:r>
+              <a:rPr lang="en-US" dirty="0" smtClean="0"/>
+              <a:t> MLR</a:t>
+            </a:r>
+          </a:p>
+          <a:p>
+            <a:r>
+              <a:rPr lang="en-US" dirty="0" smtClean="0"/>
+              <a:t> MLP</a:t>
+            </a:r>
+          </a:p>
+          <a:p>
+            <a:r>
+              <a:rPr lang="en-US" dirty="0" smtClean="0"/>
+              <a:t> XGB</a:t>
+            </a:r>
+          </a:p>
+          <a:p>
+            <a:r>
+              <a:rPr lang="en-US" dirty="0" smtClean="0"/>
+              <a:t> SVM</a:t>
+            </a:r>
+          </a:p>
+          <a:p>
+            <a:r>
+              <a:rPr lang="en-US" dirty="0" smtClean="0"/>
+              <a:t> KNN</a:t>
+            </a:r>
+          </a:p>
+          <a:p>
+            <a:r>
+              <a:rPr lang="en-US" dirty="0" smtClean="0"/>
+              <a:t>Voting</a:t>
+            </a:r>
+            <a:endParaRPr lang="en-US" dirty="0"/>
+          </a:p>
+        </p:txBody>
+      </p:sp>
+      <p:sp>
+        <p:nvSpPr>
+          <p:cNvPr id="34" name="TextBox 33"/>
+          <p:cNvSpPr txBox="1"/>
+          <p:nvPr/>
+        </p:nvSpPr>
+        <p:spPr>
+          <a:xfrm rot="16200000">
+            <a:off x="-17406" y="2505188"/>
+            <a:ext cx="466794" cy="276999"/>
           </a:xfrm>
           <a:prstGeom prst="rect">
             <a:avLst/>
@@ -3959,16 +4031,38 @@
           <a:lstStyle/>
           <a:p>
             <a:r>
-              <a:rPr lang="en-US" sz="900"/>
-              <a:t>0</a:t>
-            </a:r>
-            <a:r>
-              <a:rPr lang="en-US" sz="900" smtClean="0"/>
-              <a:t>    1</a:t>
-            </a:r>
-            <a:r>
-              <a:rPr lang="en-US" sz="900" smtClean="0"/>
-              <a:t>    2</a:t>
+              <a:rPr lang="en-US" sz="1200" dirty="0" smtClean="0"/>
+              <a:t>Girls</a:t>
+            </a:r>
+            <a:endParaRPr lang="en-US" sz="900" dirty="0"/>
+          </a:p>
+        </p:txBody>
+      </p:sp>
+      <p:sp>
+        <p:nvSpPr>
+          <p:cNvPr id="36" name="TextBox 35"/>
+          <p:cNvSpPr txBox="1"/>
+          <p:nvPr/>
+        </p:nvSpPr>
+        <p:spPr>
+          <a:xfrm rot="16200000">
+            <a:off x="-42033" y="4671381"/>
+            <a:ext cx="477438" cy="276999"/>
+          </a:xfrm>
+          <a:prstGeom prst="rect">
+            <a:avLst/>
+          </a:prstGeom>
+          <a:noFill/>
+        </p:spPr>
+        <p:txBody>
+          <a:bodyPr wrap="none" rtlCol="0">
+            <a:spAutoFit/>
+          </a:bodyPr>
+          <a:lstStyle/>
+          <a:p>
+            <a:r>
+              <a:rPr lang="en-US" sz="1200" dirty="0" smtClean="0"/>
+              <a:t>Boys</a:t>
             </a:r>
             <a:endParaRPr lang="en-US" sz="900" dirty="0"/>
           </a:p>

</xml_diff>